<commit_message>
updated presentation with technologies slides
</commit_message>
<xml_diff>
--- a/midterm presentation/Presentation-StartingTemplate.pptx
+++ b/midterm presentation/Presentation-StartingTemplate.pptx
@@ -9,10 +9,12 @@
     <p:sldId id="257" r:id="rId3"/>
     <p:sldId id="258" r:id="rId4"/>
     <p:sldId id="259" r:id="rId5"/>
-    <p:sldId id="260" r:id="rId6"/>
-    <p:sldId id="261" r:id="rId7"/>
-    <p:sldId id="262" r:id="rId8"/>
-    <p:sldId id="263" r:id="rId9"/>
+    <p:sldId id="264" r:id="rId6"/>
+    <p:sldId id="265" r:id="rId7"/>
+    <p:sldId id="260" r:id="rId8"/>
+    <p:sldId id="261" r:id="rId9"/>
+    <p:sldId id="262" r:id="rId10"/>
+    <p:sldId id="263" r:id="rId11"/>
   </p:sldIdLst>
   <p:sldSz cx="12192000" cy="6858000"/>
   <p:notesSz cx="6858000" cy="9144000"/>
@@ -282,7 +284,7 @@
           <a:p>
             <a:fld id="{2B0A5030-1C0E-44AA-B0D4-0821B95E4F3C}" type="datetimeFigureOut">
               <a:rPr lang="en-US" smtClean="0"/>
-              <a:t>3/6/2018</a:t>
+              <a:t>3/11/18</a:t>
             </a:fld>
             <a:endParaRPr lang="en-US"/>
           </a:p>
@@ -452,7 +454,7 @@
           <a:p>
             <a:fld id="{2B0A5030-1C0E-44AA-B0D4-0821B95E4F3C}" type="datetimeFigureOut">
               <a:rPr lang="en-US" smtClean="0"/>
-              <a:t>3/6/2018</a:t>
+              <a:t>3/11/18</a:t>
             </a:fld>
             <a:endParaRPr lang="en-US"/>
           </a:p>
@@ -632,7 +634,7 @@
           <a:p>
             <a:fld id="{2B0A5030-1C0E-44AA-B0D4-0821B95E4F3C}" type="datetimeFigureOut">
               <a:rPr lang="en-US" smtClean="0"/>
-              <a:t>3/6/2018</a:t>
+              <a:t>3/11/18</a:t>
             </a:fld>
             <a:endParaRPr lang="en-US"/>
           </a:p>
@@ -802,7 +804,7 @@
           <a:p>
             <a:fld id="{2B0A5030-1C0E-44AA-B0D4-0821B95E4F3C}" type="datetimeFigureOut">
               <a:rPr lang="en-US" smtClean="0"/>
-              <a:t>3/6/2018</a:t>
+              <a:t>3/11/18</a:t>
             </a:fld>
             <a:endParaRPr lang="en-US"/>
           </a:p>
@@ -1070,7 +1072,7 @@
           <a:p>
             <a:fld id="{2B0A5030-1C0E-44AA-B0D4-0821B95E4F3C}" type="datetimeFigureOut">
               <a:rPr lang="en-US" smtClean="0"/>
-              <a:t>3/6/2018</a:t>
+              <a:t>3/11/18</a:t>
             </a:fld>
             <a:endParaRPr lang="en-US"/>
           </a:p>
@@ -1302,7 +1304,7 @@
           <a:p>
             <a:fld id="{2B0A5030-1C0E-44AA-B0D4-0821B95E4F3C}" type="datetimeFigureOut">
               <a:rPr lang="en-US" smtClean="0"/>
-              <a:t>3/6/2018</a:t>
+              <a:t>3/11/18</a:t>
             </a:fld>
             <a:endParaRPr lang="en-US"/>
           </a:p>
@@ -1661,7 +1663,7 @@
           <a:p>
             <a:fld id="{2B0A5030-1C0E-44AA-B0D4-0821B95E4F3C}" type="datetimeFigureOut">
               <a:rPr lang="en-US" smtClean="0"/>
-              <a:t>3/6/2018</a:t>
+              <a:t>3/11/18</a:t>
             </a:fld>
             <a:endParaRPr lang="en-US"/>
           </a:p>
@@ -1802,7 +1804,7 @@
           <a:p>
             <a:fld id="{2B0A5030-1C0E-44AA-B0D4-0821B95E4F3C}" type="datetimeFigureOut">
               <a:rPr lang="en-US" smtClean="0"/>
-              <a:t>3/6/2018</a:t>
+              <a:t>3/11/18</a:t>
             </a:fld>
             <a:endParaRPr lang="en-US"/>
           </a:p>
@@ -1897,7 +1899,7 @@
           <a:p>
             <a:fld id="{2B0A5030-1C0E-44AA-B0D4-0821B95E4F3C}" type="datetimeFigureOut">
               <a:rPr lang="en-US" smtClean="0"/>
-              <a:t>3/6/2018</a:t>
+              <a:t>3/11/18</a:t>
             </a:fld>
             <a:endParaRPr lang="en-US"/>
           </a:p>
@@ -2254,7 +2256,7 @@
           <a:p>
             <a:fld id="{2B0A5030-1C0E-44AA-B0D4-0821B95E4F3C}" type="datetimeFigureOut">
               <a:rPr lang="en-US" smtClean="0"/>
-              <a:t>3/6/2018</a:t>
+              <a:t>3/11/18</a:t>
             </a:fld>
             <a:endParaRPr lang="en-US"/>
           </a:p>
@@ -2611,7 +2613,7 @@
           <a:p>
             <a:fld id="{2B0A5030-1C0E-44AA-B0D4-0821B95E4F3C}" type="datetimeFigureOut">
               <a:rPr lang="en-US" smtClean="0"/>
-              <a:t>3/6/2018</a:t>
+              <a:t>3/11/18</a:t>
             </a:fld>
             <a:endParaRPr lang="en-US"/>
           </a:p>
@@ -2852,7 +2854,7 @@
           <a:p>
             <a:fld id="{2B0A5030-1C0E-44AA-B0D4-0821B95E4F3C}" type="datetimeFigureOut">
               <a:rPr lang="en-US" smtClean="0"/>
-              <a:t>3/6/2018</a:t>
+              <a:t>3/11/18</a:t>
             </a:fld>
             <a:endParaRPr lang="en-US"/>
           </a:p>
@@ -3364,15 +3366,7 @@
           <a:p>
             <a:r>
               <a:rPr lang="en-US" dirty="0"/>
-              <a:t>Katie </a:t>
-            </a:r>
-            <a:r>
-              <a:rPr lang="en-US" dirty="0" err="1"/>
-              <a:t>Balcewicz</a:t>
-            </a:r>
-            <a:r>
-              <a:rPr lang="en-US" dirty="0"/>
-              <a:t> (Data Science)</a:t>
+              <a:t>Katie Balcewicz (Data Science, Office of Admissions Student Data Model Builder)</a:t>
             </a:r>
           </a:p>
           <a:p>
@@ -3387,6 +3381,92 @@
     <p:extLst>
       <p:ext uri="{BB962C8B-B14F-4D97-AF65-F5344CB8AC3E}">
         <p14:creationId xmlns:p14="http://schemas.microsoft.com/office/powerpoint/2010/main" val="2146300153"/>
+      </p:ext>
+    </p:extLst>
+  </p:cSld>
+  <p:clrMapOvr>
+    <a:masterClrMapping/>
+  </p:clrMapOvr>
+</p:sld>
+</file>
+
+<file path=ppt/slides/slide10.xml><?xml version="1.0" encoding="utf-8"?>
+<p:sld xmlns:a="http://schemas.openxmlformats.org/drawingml/2006/main" xmlns:r="http://schemas.openxmlformats.org/officeDocument/2006/relationships" xmlns:p="http://schemas.openxmlformats.org/presentationml/2006/main">
+  <p:cSld>
+    <p:spTree>
+      <p:nvGrpSpPr>
+        <p:cNvPr id="1" name=""/>
+        <p:cNvGrpSpPr/>
+        <p:nvPr/>
+      </p:nvGrpSpPr>
+      <p:grpSpPr>
+        <a:xfrm>
+          <a:off x="0" y="0"/>
+          <a:ext cx="0" cy="0"/>
+          <a:chOff x="0" y="0"/>
+          <a:chExt cx="0" cy="0"/>
+        </a:xfrm>
+      </p:grpSpPr>
+      <p:sp>
+        <p:nvSpPr>
+          <p:cNvPr id="2" name="Title 1"/>
+          <p:cNvSpPr>
+            <a:spLocks noGrp="1"/>
+          </p:cNvSpPr>
+          <p:nvPr>
+            <p:ph type="title"/>
+          </p:nvPr>
+        </p:nvSpPr>
+        <p:spPr/>
+        <p:txBody>
+          <a:bodyPr/>
+          <a:lstStyle/>
+          <a:p>
+            <a:r>
+              <a:rPr lang="en-US" dirty="0"/>
+              <a:t>Live demo of current state of the software</a:t>
+            </a:r>
+          </a:p>
+        </p:txBody>
+      </p:sp>
+      <p:sp>
+        <p:nvSpPr>
+          <p:cNvPr id="3" name="Content Placeholder 2"/>
+          <p:cNvSpPr>
+            <a:spLocks noGrp="1"/>
+          </p:cNvSpPr>
+          <p:nvPr>
+            <p:ph idx="1"/>
+          </p:nvPr>
+        </p:nvSpPr>
+        <p:spPr/>
+        <p:txBody>
+          <a:bodyPr/>
+          <a:lstStyle/>
+          <a:p>
+            <a:r>
+              <a:rPr lang="en-US" dirty="0"/>
+              <a:t>This is super important…. So, be sure not to break your code before presentation day. Fork often so that you have backups of working versions of the project.</a:t>
+            </a:r>
+          </a:p>
+          <a:p>
+            <a:r>
+              <a:rPr lang="en-US" dirty="0"/>
+              <a:t>Make sure for the mid-term, and especially the final presentation, you have a working live demo.</a:t>
+            </a:r>
+          </a:p>
+          <a:p>
+            <a:r>
+              <a:rPr lang="en-US" dirty="0"/>
+              <a:t>Your presentation ends with the live demo and afterwards you can ask the audience for questions.  </a:t>
+            </a:r>
+          </a:p>
+        </p:txBody>
+      </p:sp>
+    </p:spTree>
+    <p:extLst>
+      <p:ext uri="{BB962C8B-B14F-4D97-AF65-F5344CB8AC3E}">
+        <p14:creationId xmlns:p14="http://schemas.microsoft.com/office/powerpoint/2010/main" val="2809060499"/>
       </p:ext>
     </p:extLst>
   </p:cSld>
@@ -3454,15 +3534,7 @@
           <a:p>
             <a:r>
               <a:rPr lang="en-US" dirty="0"/>
-              <a:t>Web-</a:t>
-            </a:r>
-            <a:r>
-              <a:rPr lang="en-US" dirty="0" err="1"/>
-              <a:t>scap</a:t>
-            </a:r>
-            <a:r>
-              <a:rPr lang="en-US" dirty="0"/>
-              <a:t> data from Apple and Android App Stores on top 500 trending gaming apps</a:t>
+              <a:t>Web-scrape data from Apple and Android App Stores on top 500 trending gaming apps</a:t>
             </a:r>
           </a:p>
           <a:p>
@@ -4154,7 +4226,7 @@
             </a:pPr>
             <a:r>
               <a:rPr lang="en-US" sz="1800" dirty="0"/>
-              <a:t>                       storage, hosting                                                virtual machine                     web scrapping  </a:t>
+              <a:t>                       storage, hosting                                                virtual machine                     web scraping  </a:t>
             </a:r>
           </a:p>
           <a:p>
@@ -4258,62 +4330,150 @@
           </a:p>
         </p:txBody>
       </p:sp>
-      <p:sp>
-        <p:nvSpPr>
-          <p:cNvPr id="3" name="Content Placeholder 2"/>
-          <p:cNvSpPr>
-            <a:spLocks noGrp="1"/>
-          </p:cNvSpPr>
-          <p:nvPr>
-            <p:ph idx="1"/>
-          </p:nvPr>
-        </p:nvSpPr>
-        <p:spPr/>
-        <p:txBody>
-          <a:bodyPr>
-            <a:normAutofit lnSpcReduction="10000"/>
-          </a:bodyPr>
-          <a:lstStyle/>
-          <a:p>
-            <a:r>
-              <a:rPr lang="en-US" b="1" dirty="0">
-                <a:solidFill>
-                  <a:srgbClr val="C00000"/>
-                </a:solidFill>
-              </a:rPr>
-              <a:t>THIS NEEDS TO BE A </a:t>
-            </a:r>
-            <a:r>
-              <a:rPr lang="en-US" b="1" u="sng" dirty="0">
-                <a:solidFill>
-                  <a:srgbClr val="C00000"/>
-                </a:solidFill>
-              </a:rPr>
-              <a:t>TECHNICAL</a:t>
-            </a:r>
-            <a:r>
-              <a:rPr lang="en-US" b="1" dirty="0">
-                <a:solidFill>
-                  <a:srgbClr val="C00000"/>
-                </a:solidFill>
-              </a:rPr>
-              <a:t> SLIDE THAT ONLY A COMPUTER SCIENTISTS WOULD UNDERSTAND OR APPRECIATE.</a:t>
-            </a:r>
-          </a:p>
-          <a:p>
-            <a:r>
-              <a:rPr lang="en-US" dirty="0"/>
-              <a:t>So, possibly on this slide, and one more slides, you could further elaborate on one or more of the main technologies you might be using.  For example, screen shots, sample code, explanations of what “Go” is and how it works. Or, you could show a screen shot of your development tool and point out some very neat part of the code. </a:t>
-            </a:r>
-          </a:p>
-          <a:p>
-            <a:r>
-              <a:rPr lang="en-US" dirty="0"/>
-              <a:t>The side-purpose of the presentation is to introduce the whole class to numerous technologies that we might not know anything about. So that, somebody might say to themselves: “Hmmm… I want to learn about this ‘Go’ thingy…”</a:t>
-            </a:r>
-          </a:p>
-        </p:txBody>
-      </p:sp>
+      <p:pic>
+        <p:nvPicPr>
+          <p:cNvPr id="7" name="Picture 6">
+            <a:extLst>
+              <a:ext uri="{FF2B5EF4-FFF2-40B4-BE49-F238E27FC236}">
+                <a16:creationId xmlns:a16="http://schemas.microsoft.com/office/drawing/2014/main" id="{033FAB88-647B-9E42-8317-CDCD5E52BBC6}"/>
+              </a:ext>
+            </a:extLst>
+          </p:cNvPr>
+          <p:cNvPicPr>
+            <a:picLocks noChangeAspect="1"/>
+          </p:cNvPicPr>
+          <p:nvPr/>
+        </p:nvPicPr>
+        <p:blipFill>
+          <a:blip r:embed="rId2">
+            <a:extLst>
+              <a:ext uri="{28A0092B-C50C-407E-A947-70E740481C1C}">
+                <a14:useLocalDpi xmlns:a14="http://schemas.microsoft.com/office/drawing/2010/main" val="0"/>
+              </a:ext>
+            </a:extLst>
+          </a:blip>
+          <a:stretch>
+            <a:fillRect/>
+          </a:stretch>
+        </p:blipFill>
+        <p:spPr>
+          <a:xfrm>
+            <a:off x="1143261" y="2260163"/>
+            <a:ext cx="3797300" cy="419100"/>
+          </a:xfrm>
+          <a:prstGeom prst="rect">
+            <a:avLst/>
+          </a:prstGeom>
+        </p:spPr>
+      </p:pic>
+      <p:pic>
+        <p:nvPicPr>
+          <p:cNvPr id="9" name="Picture 8">
+            <a:extLst>
+              <a:ext uri="{FF2B5EF4-FFF2-40B4-BE49-F238E27FC236}">
+                <a16:creationId xmlns:a16="http://schemas.microsoft.com/office/drawing/2014/main" id="{B0F8E954-93A9-3B44-AD91-2418E602570D}"/>
+              </a:ext>
+            </a:extLst>
+          </p:cNvPr>
+          <p:cNvPicPr>
+            <a:picLocks noChangeAspect="1"/>
+          </p:cNvPicPr>
+          <p:nvPr/>
+        </p:nvPicPr>
+        <p:blipFill>
+          <a:blip r:embed="rId3">
+            <a:extLst>
+              <a:ext uri="{28A0092B-C50C-407E-A947-70E740481C1C}">
+                <a14:useLocalDpi xmlns:a14="http://schemas.microsoft.com/office/drawing/2010/main" val="0"/>
+              </a:ext>
+            </a:extLst>
+          </a:blip>
+          <a:stretch>
+            <a:fillRect/>
+          </a:stretch>
+        </p:blipFill>
+        <p:spPr>
+          <a:xfrm>
+            <a:off x="868538" y="2786014"/>
+            <a:ext cx="4346747" cy="3845593"/>
+          </a:xfrm>
+          <a:prstGeom prst="rect">
+            <a:avLst/>
+          </a:prstGeom>
+        </p:spPr>
+      </p:pic>
+      <p:pic>
+        <p:nvPicPr>
+          <p:cNvPr id="11" name="Picture 10">
+            <a:extLst>
+              <a:ext uri="{FF2B5EF4-FFF2-40B4-BE49-F238E27FC236}">
+                <a16:creationId xmlns:a16="http://schemas.microsoft.com/office/drawing/2014/main" id="{23EB04CF-B06E-364F-B891-34FFCADE813A}"/>
+              </a:ext>
+            </a:extLst>
+          </p:cNvPr>
+          <p:cNvPicPr>
+            <a:picLocks noChangeAspect="1"/>
+          </p:cNvPicPr>
+          <p:nvPr/>
+        </p:nvPicPr>
+        <p:blipFill>
+          <a:blip r:embed="rId4">
+            <a:extLst>
+              <a:ext uri="{28A0092B-C50C-407E-A947-70E740481C1C}">
+                <a14:useLocalDpi xmlns:a14="http://schemas.microsoft.com/office/drawing/2010/main" val="0"/>
+              </a:ext>
+            </a:extLst>
+          </a:blip>
+          <a:stretch>
+            <a:fillRect/>
+          </a:stretch>
+        </p:blipFill>
+        <p:spPr>
+          <a:xfrm>
+            <a:off x="7066509" y="2310963"/>
+            <a:ext cx="3365500" cy="368300"/>
+          </a:xfrm>
+          <a:prstGeom prst="rect">
+            <a:avLst/>
+          </a:prstGeom>
+        </p:spPr>
+      </p:pic>
+      <p:pic>
+        <p:nvPicPr>
+          <p:cNvPr id="13" name="Picture 12">
+            <a:extLst>
+              <a:ext uri="{FF2B5EF4-FFF2-40B4-BE49-F238E27FC236}">
+                <a16:creationId xmlns:a16="http://schemas.microsoft.com/office/drawing/2014/main" id="{06BA7890-5C30-BB49-8130-21C679FA151E}"/>
+              </a:ext>
+            </a:extLst>
+          </p:cNvPr>
+          <p:cNvPicPr>
+            <a:picLocks noChangeAspect="1"/>
+          </p:cNvPicPr>
+          <p:nvPr/>
+        </p:nvPicPr>
+        <p:blipFill>
+          <a:blip r:embed="rId5">
+            <a:extLst>
+              <a:ext uri="{28A0092B-C50C-407E-A947-70E740481C1C}">
+                <a14:useLocalDpi xmlns:a14="http://schemas.microsoft.com/office/drawing/2010/main" val="0"/>
+              </a:ext>
+            </a:extLst>
+          </a:blip>
+          <a:stretch>
+            <a:fillRect/>
+          </a:stretch>
+        </p:blipFill>
+        <p:spPr>
+          <a:xfrm>
+            <a:off x="6311203" y="2786014"/>
+            <a:ext cx="4876112" cy="3845593"/>
+          </a:xfrm>
+          <a:prstGeom prst="rect">
+            <a:avLst/>
+          </a:prstGeom>
+        </p:spPr>
+      </p:pic>
     </p:spTree>
     <p:extLst>
       <p:ext uri="{BB962C8B-B14F-4D97-AF65-F5344CB8AC3E}">
@@ -4356,12 +4516,233 @@
         </p:nvSpPr>
         <p:spPr/>
         <p:txBody>
-          <a:bodyPr/>
+          <a:bodyPr>
+            <a:normAutofit/>
+          </a:bodyPr>
           <a:lstStyle/>
           <a:p>
             <a:r>
               <a:rPr lang="en-US" dirty="0"/>
-              <a:t>ONE SLIDE: Describe the Semester-long Scrum Process	</a:t>
+              <a:t>TECHNOLOGIES</a:t>
+            </a:r>
+          </a:p>
+        </p:txBody>
+      </p:sp>
+      <p:pic>
+        <p:nvPicPr>
+          <p:cNvPr id="14" name="Picture 13">
+            <a:extLst>
+              <a:ext uri="{FF2B5EF4-FFF2-40B4-BE49-F238E27FC236}">
+                <a16:creationId xmlns:a16="http://schemas.microsoft.com/office/drawing/2014/main" id="{CA6642F5-9E6E-974B-9AB2-E494E534899E}"/>
+              </a:ext>
+            </a:extLst>
+          </p:cNvPr>
+          <p:cNvPicPr>
+            <a:picLocks noChangeAspect="1"/>
+          </p:cNvPicPr>
+          <p:nvPr/>
+        </p:nvPicPr>
+        <p:blipFill>
+          <a:blip r:embed="rId2">
+            <a:extLst>
+              <a:ext uri="{28A0092B-C50C-407E-A947-70E740481C1C}">
+                <a14:useLocalDpi xmlns:a14="http://schemas.microsoft.com/office/drawing/2010/main" val="0"/>
+              </a:ext>
+            </a:extLst>
+          </a:blip>
+          <a:stretch>
+            <a:fillRect/>
+          </a:stretch>
+        </p:blipFill>
+        <p:spPr>
+          <a:xfrm>
+            <a:off x="457200" y="3056466"/>
+            <a:ext cx="11277600" cy="1879600"/>
+          </a:xfrm>
+          <a:prstGeom prst="rect">
+            <a:avLst/>
+          </a:prstGeom>
+        </p:spPr>
+      </p:pic>
+    </p:spTree>
+    <p:extLst>
+      <p:ext uri="{BB962C8B-B14F-4D97-AF65-F5344CB8AC3E}">
+        <p14:creationId xmlns:p14="http://schemas.microsoft.com/office/powerpoint/2010/main" val="2501803052"/>
+      </p:ext>
+    </p:extLst>
+  </p:cSld>
+  <p:clrMapOvr>
+    <a:masterClrMapping/>
+  </p:clrMapOvr>
+</p:sld>
+</file>
+
+<file path=ppt/slides/slide6.xml><?xml version="1.0" encoding="utf-8"?>
+<p:sld xmlns:a="http://schemas.openxmlformats.org/drawingml/2006/main" xmlns:r="http://schemas.openxmlformats.org/officeDocument/2006/relationships" xmlns:p="http://schemas.openxmlformats.org/presentationml/2006/main">
+  <p:cSld>
+    <p:spTree>
+      <p:nvGrpSpPr>
+        <p:cNvPr id="1" name=""/>
+        <p:cNvGrpSpPr/>
+        <p:nvPr/>
+      </p:nvGrpSpPr>
+      <p:grpSpPr>
+        <a:xfrm>
+          <a:off x="0" y="0"/>
+          <a:ext cx="0" cy="0"/>
+          <a:chOff x="0" y="0"/>
+          <a:chExt cx="0" cy="0"/>
+        </a:xfrm>
+      </p:grpSpPr>
+      <p:sp>
+        <p:nvSpPr>
+          <p:cNvPr id="2" name="Title 1"/>
+          <p:cNvSpPr>
+            <a:spLocks noGrp="1"/>
+          </p:cNvSpPr>
+          <p:nvPr>
+            <p:ph type="title"/>
+          </p:nvPr>
+        </p:nvSpPr>
+        <p:spPr/>
+        <p:txBody>
+          <a:bodyPr>
+            <a:normAutofit/>
+          </a:bodyPr>
+          <a:lstStyle/>
+          <a:p>
+            <a:r>
+              <a:rPr lang="en-US" dirty="0"/>
+              <a:t>TECHNOLOGIES</a:t>
+            </a:r>
+          </a:p>
+        </p:txBody>
+      </p:sp>
+      <p:pic>
+        <p:nvPicPr>
+          <p:cNvPr id="4" name="Picture 3">
+            <a:extLst>
+              <a:ext uri="{FF2B5EF4-FFF2-40B4-BE49-F238E27FC236}">
+                <a16:creationId xmlns:a16="http://schemas.microsoft.com/office/drawing/2014/main" id="{01FECE59-664F-3943-B969-6CDA2718C2C5}"/>
+              </a:ext>
+            </a:extLst>
+          </p:cNvPr>
+          <p:cNvPicPr>
+            <a:picLocks noChangeAspect="1"/>
+          </p:cNvPicPr>
+          <p:nvPr/>
+        </p:nvPicPr>
+        <p:blipFill>
+          <a:blip r:embed="rId2">
+            <a:extLst>
+              <a:ext uri="{28A0092B-C50C-407E-A947-70E740481C1C}">
+                <a14:useLocalDpi xmlns:a14="http://schemas.microsoft.com/office/drawing/2010/main" val="0"/>
+              </a:ext>
+            </a:extLst>
+          </a:blip>
+          <a:stretch>
+            <a:fillRect/>
+          </a:stretch>
+        </p:blipFill>
+        <p:spPr>
+          <a:xfrm>
+            <a:off x="6096000" y="2406405"/>
+            <a:ext cx="4359913" cy="2951941"/>
+          </a:xfrm>
+          <a:prstGeom prst="rect">
+            <a:avLst/>
+          </a:prstGeom>
+        </p:spPr>
+      </p:pic>
+      <p:pic>
+        <p:nvPicPr>
+          <p:cNvPr id="6" name="Picture 5">
+            <a:extLst>
+              <a:ext uri="{FF2B5EF4-FFF2-40B4-BE49-F238E27FC236}">
+                <a16:creationId xmlns:a16="http://schemas.microsoft.com/office/drawing/2014/main" id="{344CBA2F-7ED3-3B4B-A97D-6964127EB61D}"/>
+              </a:ext>
+            </a:extLst>
+          </p:cNvPr>
+          <p:cNvPicPr>
+            <a:picLocks noChangeAspect="1"/>
+          </p:cNvPicPr>
+          <p:nvPr/>
+        </p:nvPicPr>
+        <p:blipFill>
+          <a:blip r:embed="rId3">
+            <a:extLst>
+              <a:ext uri="{28A0092B-C50C-407E-A947-70E740481C1C}">
+                <a14:useLocalDpi xmlns:a14="http://schemas.microsoft.com/office/drawing/2010/main" val="0"/>
+              </a:ext>
+            </a:extLst>
+          </a:blip>
+          <a:stretch>
+            <a:fillRect/>
+          </a:stretch>
+        </p:blipFill>
+        <p:spPr>
+          <a:xfrm>
+            <a:off x="1404079" y="2406405"/>
+            <a:ext cx="4359913" cy="4040895"/>
+          </a:xfrm>
+          <a:prstGeom prst="rect">
+            <a:avLst/>
+          </a:prstGeom>
+        </p:spPr>
+      </p:pic>
+    </p:spTree>
+    <p:extLst>
+      <p:ext uri="{BB962C8B-B14F-4D97-AF65-F5344CB8AC3E}">
+        <p14:creationId xmlns:p14="http://schemas.microsoft.com/office/powerpoint/2010/main" val="1333288560"/>
+      </p:ext>
+    </p:extLst>
+  </p:cSld>
+  <p:clrMapOvr>
+    <a:masterClrMapping/>
+  </p:clrMapOvr>
+</p:sld>
+</file>
+
+<file path=ppt/slides/slide7.xml><?xml version="1.0" encoding="utf-8"?>
+<p:sld xmlns:a="http://schemas.openxmlformats.org/drawingml/2006/main" xmlns:r="http://schemas.openxmlformats.org/officeDocument/2006/relationships" xmlns:p="http://schemas.openxmlformats.org/presentationml/2006/main">
+  <p:cSld>
+    <p:spTree>
+      <p:nvGrpSpPr>
+        <p:cNvPr id="1" name=""/>
+        <p:cNvGrpSpPr/>
+        <p:nvPr/>
+      </p:nvGrpSpPr>
+      <p:grpSpPr>
+        <a:xfrm>
+          <a:off x="0" y="0"/>
+          <a:ext cx="0" cy="0"/>
+          <a:chOff x="0" y="0"/>
+          <a:chExt cx="0" cy="0"/>
+        </a:xfrm>
+      </p:grpSpPr>
+      <p:sp>
+        <p:nvSpPr>
+          <p:cNvPr id="2" name="Title 1"/>
+          <p:cNvSpPr>
+            <a:spLocks noGrp="1"/>
+          </p:cNvSpPr>
+          <p:nvPr>
+            <p:ph type="title"/>
+          </p:nvPr>
+        </p:nvSpPr>
+        <p:spPr>
+          <a:xfrm>
+            <a:off x="2231136" y="964692"/>
+            <a:ext cx="7729728" cy="1188720"/>
+          </a:xfrm>
+        </p:spPr>
+        <p:txBody>
+          <a:bodyPr/>
+          <a:lstStyle/>
+          <a:p>
+            <a:r>
+              <a:rPr lang="en-US" dirty="0"/>
+              <a:t>the Semester-long Scrum Process</a:t>
             </a:r>
           </a:p>
         </p:txBody>
@@ -4434,7 +4815,7 @@
 </p:sld>
 </file>
 
-<file path=ppt/slides/slide6.xml><?xml version="1.0" encoding="utf-8"?>
+<file path=ppt/slides/slide8.xml><?xml version="1.0" encoding="utf-8"?>
 <p:sld xmlns:a="http://schemas.openxmlformats.org/drawingml/2006/main" xmlns:r="http://schemas.openxmlformats.org/officeDocument/2006/relationships" xmlns:p="http://schemas.openxmlformats.org/presentationml/2006/main">
   <p:cSld>
     <p:spTree>
@@ -4516,7 +4897,7 @@
 </p:sld>
 </file>
 
-<file path=ppt/slides/slide7.xml><?xml version="1.0" encoding="utf-8"?>
+<file path=ppt/slides/slide9.xml><?xml version="1.0" encoding="utf-8"?>
 <p:sld xmlns:a="http://schemas.openxmlformats.org/drawingml/2006/main" xmlns:r="http://schemas.openxmlformats.org/officeDocument/2006/relationships" xmlns:p="http://schemas.openxmlformats.org/presentationml/2006/main">
   <p:cSld>
     <p:spTree>
@@ -4591,12 +4972,8 @@
           </a:p>
           <a:p>
             <a:r>
-              <a:rPr lang="en-US" dirty="0" err="1"/>
-              <a:t>Gogle</a:t>
-            </a:r>
-            <a:r>
               <a:rPr lang="en-US" dirty="0"/>
-              <a:t> Cloud storage space</a:t>
+              <a:t>Google Cloud storage space</a:t>
             </a:r>
           </a:p>
         </p:txBody>
@@ -4605,92 +4982,6 @@
     <p:extLst>
       <p:ext uri="{BB962C8B-B14F-4D97-AF65-F5344CB8AC3E}">
         <p14:creationId xmlns:p14="http://schemas.microsoft.com/office/powerpoint/2010/main" val="2933726341"/>
-      </p:ext>
-    </p:extLst>
-  </p:cSld>
-  <p:clrMapOvr>
-    <a:masterClrMapping/>
-  </p:clrMapOvr>
-</p:sld>
-</file>
-
-<file path=ppt/slides/slide8.xml><?xml version="1.0" encoding="utf-8"?>
-<p:sld xmlns:a="http://schemas.openxmlformats.org/drawingml/2006/main" xmlns:r="http://schemas.openxmlformats.org/officeDocument/2006/relationships" xmlns:p="http://schemas.openxmlformats.org/presentationml/2006/main">
-  <p:cSld>
-    <p:spTree>
-      <p:nvGrpSpPr>
-        <p:cNvPr id="1" name=""/>
-        <p:cNvGrpSpPr/>
-        <p:nvPr/>
-      </p:nvGrpSpPr>
-      <p:grpSpPr>
-        <a:xfrm>
-          <a:off x="0" y="0"/>
-          <a:ext cx="0" cy="0"/>
-          <a:chOff x="0" y="0"/>
-          <a:chExt cx="0" cy="0"/>
-        </a:xfrm>
-      </p:grpSpPr>
-      <p:sp>
-        <p:nvSpPr>
-          <p:cNvPr id="2" name="Title 1"/>
-          <p:cNvSpPr>
-            <a:spLocks noGrp="1"/>
-          </p:cNvSpPr>
-          <p:nvPr>
-            <p:ph type="title"/>
-          </p:nvPr>
-        </p:nvSpPr>
-        <p:spPr/>
-        <p:txBody>
-          <a:bodyPr/>
-          <a:lstStyle/>
-          <a:p>
-            <a:r>
-              <a:rPr lang="en-US" dirty="0"/>
-              <a:t>Live demo of current state of the software</a:t>
-            </a:r>
-          </a:p>
-        </p:txBody>
-      </p:sp>
-      <p:sp>
-        <p:nvSpPr>
-          <p:cNvPr id="3" name="Content Placeholder 2"/>
-          <p:cNvSpPr>
-            <a:spLocks noGrp="1"/>
-          </p:cNvSpPr>
-          <p:nvPr>
-            <p:ph idx="1"/>
-          </p:nvPr>
-        </p:nvSpPr>
-        <p:spPr/>
-        <p:txBody>
-          <a:bodyPr/>
-          <a:lstStyle/>
-          <a:p>
-            <a:r>
-              <a:rPr lang="en-US" dirty="0"/>
-              <a:t>This is super important…. So, be sure not to break your code before presentation day. Fork often so that you have backups of working versions of the project.</a:t>
-            </a:r>
-          </a:p>
-          <a:p>
-            <a:r>
-              <a:rPr lang="en-US" dirty="0"/>
-              <a:t>Make sure for the mid-term, and especially the final presentation, you have a working live demo.</a:t>
-            </a:r>
-          </a:p>
-          <a:p>
-            <a:r>
-              <a:rPr lang="en-US" dirty="0"/>
-              <a:t>Your presentation ends with the live demo and afterwards you can ask the audience for questions.  </a:t>
-            </a:r>
-          </a:p>
-        </p:txBody>
-      </p:sp>
-    </p:spTree>
-    <p:extLst>
-      <p:ext uri="{BB962C8B-B14F-4D97-AF65-F5344CB8AC3E}">
-        <p14:creationId xmlns:p14="http://schemas.microsoft.com/office/powerpoint/2010/main" val="2809060499"/>
       </p:ext>
     </p:extLst>
   </p:cSld>

</xml_diff>